<commit_message>
finished 2nd experiment result
</commit_message>
<xml_diff>
--- a/report/fig_How_to_take_pictures.pptx
+++ b/report/fig_How_to_take_pictures.pptx
@@ -245,7 +245,7 @@
           <a:p>
             <a:fld id="{10C9C662-03AB-4E37-8242-45C26684186D}" type="datetimeFigureOut">
               <a:rPr lang="en-US" smtClean="0"/>
-              <a:t>1/28/2019</a:t>
+              <a:t>1/29/2019</a:t>
             </a:fld>
             <a:endParaRPr lang="en-US"/>
           </a:p>
@@ -447,7 +447,7 @@
           <a:p>
             <a:fld id="{10C9C662-03AB-4E37-8242-45C26684186D}" type="datetimeFigureOut">
               <a:rPr lang="en-US" smtClean="0"/>
-              <a:t>1/28/2019</a:t>
+              <a:t>1/29/2019</a:t>
             </a:fld>
             <a:endParaRPr lang="en-US"/>
           </a:p>
@@ -659,7 +659,7 @@
           <a:p>
             <a:fld id="{10C9C662-03AB-4E37-8242-45C26684186D}" type="datetimeFigureOut">
               <a:rPr lang="en-US" smtClean="0"/>
-              <a:t>1/28/2019</a:t>
+              <a:t>1/29/2019</a:t>
             </a:fld>
             <a:endParaRPr lang="en-US"/>
           </a:p>
@@ -861,7 +861,7 @@
           <a:p>
             <a:fld id="{10C9C662-03AB-4E37-8242-45C26684186D}" type="datetimeFigureOut">
               <a:rPr lang="en-US" smtClean="0"/>
-              <a:t>1/28/2019</a:t>
+              <a:t>1/29/2019</a:t>
             </a:fld>
             <a:endParaRPr lang="en-US"/>
           </a:p>
@@ -1107,7 +1107,7 @@
           <a:p>
             <a:fld id="{10C9C662-03AB-4E37-8242-45C26684186D}" type="datetimeFigureOut">
               <a:rPr lang="en-US" smtClean="0"/>
-              <a:t>1/28/2019</a:t>
+              <a:t>1/29/2019</a:t>
             </a:fld>
             <a:endParaRPr lang="en-US"/>
           </a:p>
@@ -1403,7 +1403,7 @@
           <a:p>
             <a:fld id="{10C9C662-03AB-4E37-8242-45C26684186D}" type="datetimeFigureOut">
               <a:rPr lang="en-US" smtClean="0"/>
-              <a:t>1/28/2019</a:t>
+              <a:t>1/29/2019</a:t>
             </a:fld>
             <a:endParaRPr lang="en-US"/>
           </a:p>
@@ -1834,7 +1834,7 @@
           <a:p>
             <a:fld id="{10C9C662-03AB-4E37-8242-45C26684186D}" type="datetimeFigureOut">
               <a:rPr lang="en-US" smtClean="0"/>
-              <a:t>1/28/2019</a:t>
+              <a:t>1/29/2019</a:t>
             </a:fld>
             <a:endParaRPr lang="en-US"/>
           </a:p>
@@ -1952,7 +1952,7 @@
           <a:p>
             <a:fld id="{10C9C662-03AB-4E37-8242-45C26684186D}" type="datetimeFigureOut">
               <a:rPr lang="en-US" smtClean="0"/>
-              <a:t>1/28/2019</a:t>
+              <a:t>1/29/2019</a:t>
             </a:fld>
             <a:endParaRPr lang="en-US"/>
           </a:p>
@@ -2047,7 +2047,7 @@
           <a:p>
             <a:fld id="{10C9C662-03AB-4E37-8242-45C26684186D}" type="datetimeFigureOut">
               <a:rPr lang="en-US" smtClean="0"/>
-              <a:t>1/28/2019</a:t>
+              <a:t>1/29/2019</a:t>
             </a:fld>
             <a:endParaRPr lang="en-US"/>
           </a:p>
@@ -2356,7 +2356,7 @@
           <a:p>
             <a:fld id="{10C9C662-03AB-4E37-8242-45C26684186D}" type="datetimeFigureOut">
               <a:rPr lang="en-US" smtClean="0"/>
-              <a:t>1/28/2019</a:t>
+              <a:t>1/29/2019</a:t>
             </a:fld>
             <a:endParaRPr lang="en-US"/>
           </a:p>
@@ -2609,7 +2609,7 @@
           <a:p>
             <a:fld id="{10C9C662-03AB-4E37-8242-45C26684186D}" type="datetimeFigureOut">
               <a:rPr lang="en-US" smtClean="0"/>
-              <a:t>1/28/2019</a:t>
+              <a:t>1/29/2019</a:t>
             </a:fld>
             <a:endParaRPr lang="en-US"/>
           </a:p>
@@ -2854,7 +2854,7 @@
           <a:p>
             <a:fld id="{10C9C662-03AB-4E37-8242-45C26684186D}" type="datetimeFigureOut">
               <a:rPr lang="en-US" smtClean="0"/>
-              <a:t>1/28/2019</a:t>
+              <a:t>1/29/2019</a:t>
             </a:fld>
             <a:endParaRPr lang="en-US"/>
           </a:p>
@@ -3261,16 +3261,16 @@
       </p:grpSpPr>
       <p:grpSp>
         <p:nvGrpSpPr>
-          <p:cNvPr id="24" name="グループ化 23"/>
+          <p:cNvPr id="3" name="グループ化 2"/>
           <p:cNvGrpSpPr/>
           <p:nvPr/>
         </p:nvGrpSpPr>
         <p:grpSpPr>
           <a:xfrm>
-            <a:off x="2718547" y="1152735"/>
-            <a:ext cx="4406691" cy="2729641"/>
-            <a:chOff x="2718547" y="1152735"/>
-            <a:chExt cx="4406691" cy="2729641"/>
+            <a:off x="2807224" y="1791673"/>
+            <a:ext cx="3575284" cy="1985520"/>
+            <a:chOff x="2807224" y="1791673"/>
+            <a:chExt cx="3575284" cy="1985520"/>
           </a:xfrm>
         </p:grpSpPr>
         <p:sp>
@@ -3281,52 +3281,30 @@
           </p:nvSpPr>
           <p:spPr>
             <a:xfrm>
-              <a:off x="2718547" y="2737597"/>
-              <a:ext cx="1649506" cy="699247"/>
+              <a:off x="2807224" y="2763747"/>
+              <a:ext cx="1554480" cy="640080"/>
             </a:xfrm>
             <a:prstGeom prst="roundRect">
               <a:avLst/>
             </a:prstGeom>
-          </p:spPr>
-          <p:style>
-            <a:lnRef idx="2">
-              <a:schemeClr val="accent1">
-                <a:shade val="50000"/>
-              </a:schemeClr>
-            </a:lnRef>
-            <a:fillRef idx="1">
-              <a:schemeClr val="accent1"/>
-            </a:fillRef>
-            <a:effectRef idx="0">
-              <a:schemeClr val="accent1"/>
-            </a:effectRef>
-            <a:fontRef idx="minor">
-              <a:schemeClr val="lt1"/>
-            </a:fontRef>
-          </p:style>
-          <p:txBody>
-            <a:bodyPr rtlCol="0" anchor="ctr"/>
-            <a:lstStyle/>
-            <a:p>
-              <a:pPr algn="ctr"/>
-              <a:endParaRPr lang="en-US"/>
-            </a:p>
-          </p:txBody>
-        </p:sp>
-        <p:sp>
-          <p:nvSpPr>
-            <p:cNvPr id="6" name="角丸四角形 5"/>
-            <p:cNvSpPr/>
-            <p:nvPr/>
-          </p:nvSpPr>
-          <p:spPr>
-            <a:xfrm rot="21024751">
-              <a:off x="2813908" y="1610285"/>
-              <a:ext cx="242047" cy="1165412"/>
-            </a:xfrm>
-            <a:prstGeom prst="roundRect">
-              <a:avLst/>
-            </a:prstGeom>
+            <a:pattFill prst="pct30">
+              <a:fgClr>
+                <a:schemeClr val="bg1">
+                  <a:lumMod val="50000"/>
+                </a:schemeClr>
+              </a:fgClr>
+              <a:bgClr>
+                <a:schemeClr val="bg1"/>
+              </a:bgClr>
+            </a:pattFill>
+            <a:ln>
+              <a:solidFill>
+                <a:schemeClr val="tx1">
+                  <a:lumMod val="65000"/>
+                  <a:lumOff val="35000"/>
+                </a:schemeClr>
+              </a:solidFill>
+            </a:ln>
           </p:spPr>
           <p:style>
             <a:lnRef idx="2">
@@ -3361,8 +3339,8 @@
           </p:nvSpPr>
           <p:spPr>
             <a:xfrm>
-              <a:off x="2934931" y="1152735"/>
-              <a:ext cx="1208792" cy="369332"/>
+              <a:off x="3371852" y="1869656"/>
+              <a:ext cx="890437" cy="276999"/>
             </a:xfrm>
             <a:prstGeom prst="rect">
               <a:avLst/>
@@ -3376,48 +3354,19 @@
             <a:lstStyle/>
             <a:p>
               <a:r>
-                <a:rPr lang="en-US" dirty="0" smtClean="0"/>
+                <a:rPr lang="en-US" sz="1200" dirty="0" smtClean="0">
+                  <a:latin typeface="Times New Roman" panose="02020603050405020304" pitchFamily="18" charset="0"/>
+                  <a:cs typeface="Times New Roman" panose="02020603050405020304" pitchFamily="18" charset="0"/>
+                </a:rPr>
                 <a:t>Toilet bowl</a:t>
               </a:r>
+              <a:endParaRPr lang="en-US" sz="1200" dirty="0" smtClean="0">
+                <a:latin typeface="Times New Roman" panose="02020603050405020304" pitchFamily="18" charset="0"/>
+                <a:cs typeface="Times New Roman" panose="02020603050405020304" pitchFamily="18" charset="0"/>
+              </a:endParaRPr>
             </a:p>
           </p:txBody>
         </p:sp>
-        <p:cxnSp>
-          <p:nvCxnSpPr>
-            <p:cNvPr id="9" name="直線コネクタ 8"/>
-            <p:cNvCxnSpPr/>
-            <p:nvPr/>
-          </p:nvCxnSpPr>
-          <p:spPr>
-            <a:xfrm flipV="1">
-              <a:off x="4368053" y="3087219"/>
-              <a:ext cx="1467597" cy="1"/>
-            </a:xfrm>
-            <a:prstGeom prst="line">
-              <a:avLst/>
-            </a:prstGeom>
-            <a:ln>
-              <a:solidFill>
-                <a:schemeClr val="tx1"/>
-              </a:solidFill>
-              <a:prstDash val="dash"/>
-            </a:ln>
-          </p:spPr>
-          <p:style>
-            <a:lnRef idx="1">
-              <a:schemeClr val="accent1"/>
-            </a:lnRef>
-            <a:fillRef idx="0">
-              <a:schemeClr val="accent1"/>
-            </a:fillRef>
-            <a:effectRef idx="0">
-              <a:schemeClr val="accent1"/>
-            </a:effectRef>
-            <a:fontRef idx="minor">
-              <a:schemeClr val="tx1"/>
-            </a:fontRef>
-          </p:style>
-        </p:cxnSp>
         <p:grpSp>
           <p:nvGrpSpPr>
             <p:cNvPr id="13" name="グループ化 12"/>
@@ -3426,11 +3375,21 @@
           </p:nvGrpSpPr>
           <p:grpSpPr>
             <a:xfrm>
-              <a:off x="5835650" y="2957045"/>
+              <a:off x="5654561" y="2953612"/>
               <a:ext cx="322730" cy="260350"/>
               <a:chOff x="6052110" y="2671295"/>
               <a:chExt cx="322730" cy="260350"/>
             </a:xfrm>
+            <a:pattFill prst="pct70">
+              <a:fgClr>
+                <a:schemeClr val="bg1">
+                  <a:lumMod val="50000"/>
+                </a:schemeClr>
+              </a:fgClr>
+              <a:bgClr>
+                <a:schemeClr val="bg1"/>
+              </a:bgClr>
+            </a:pattFill>
           </p:grpSpPr>
           <p:sp>
             <p:nvSpPr>
@@ -3446,6 +3405,12 @@
               <a:prstGeom prst="rect">
                 <a:avLst/>
               </a:prstGeom>
+              <a:grpFill/>
+              <a:ln>
+                <a:solidFill>
+                  <a:schemeClr val="tx1"/>
+                </a:solidFill>
+              </a:ln>
             </p:spPr>
             <p:style>
               <a:lnRef idx="2">
@@ -3486,6 +3451,12 @@
               <a:prstGeom prst="triangle">
                 <a:avLst/>
               </a:prstGeom>
+              <a:grpFill/>
+              <a:ln>
+                <a:solidFill>
+                  <a:schemeClr val="tx1"/>
+                </a:solidFill>
+              </a:ln>
             </p:spPr>
             <p:style>
               <a:lnRef idx="2">
@@ -3556,7 +3527,7 @@
           </p:nvCxnSpPr>
           <p:spPr>
             <a:xfrm flipV="1">
-              <a:off x="5829300" y="2388347"/>
+              <a:off x="5648212" y="2388347"/>
               <a:ext cx="0" cy="1048497"/>
             </a:xfrm>
             <a:prstGeom prst="line">
@@ -3592,15 +3563,17 @@
           <p:spPr>
             <a:xfrm>
               <a:off x="4368052" y="2455395"/>
-              <a:ext cx="1461249" cy="0"/>
+              <a:ext cx="1280160" cy="0"/>
             </a:xfrm>
             <a:prstGeom prst="line">
               <a:avLst/>
             </a:prstGeom>
-            <a:ln>
+            <a:ln w="6350">
               <a:solidFill>
                 <a:schemeClr val="tx1"/>
               </a:solidFill>
+              <a:headEnd type="arrow" w="med" len="med"/>
+              <a:tailEnd type="arrow" w="med" len="med"/>
             </a:ln>
           </p:spPr>
           <p:style>
@@ -3626,8 +3599,8 @@
           </p:nvSpPr>
           <p:spPr>
             <a:xfrm>
-              <a:off x="4638763" y="2086063"/>
-              <a:ext cx="904415" cy="369332"/>
+              <a:off x="4800384" y="2212389"/>
+              <a:ext cx="415498" cy="276999"/>
             </a:xfrm>
             <a:prstGeom prst="rect">
               <a:avLst/>
@@ -3641,10 +3614,16 @@
             <a:lstStyle/>
             <a:p>
               <a:r>
-                <a:rPr lang="en-US" dirty="0" smtClean="0"/>
-                <a:t>150mm</a:t>
+                <a:rPr lang="en-US" sz="1200" dirty="0" smtClean="0">
+                  <a:latin typeface="Times New Roman" panose="02020603050405020304" pitchFamily="18" charset="0"/>
+                  <a:cs typeface="Times New Roman" panose="02020603050405020304" pitchFamily="18" charset="0"/>
+                </a:rPr>
+                <a:t>800</a:t>
               </a:r>
-              <a:endParaRPr lang="en-US" dirty="0"/>
+              <a:endParaRPr lang="en-US" sz="1200" dirty="0">
+                <a:latin typeface="Times New Roman" panose="02020603050405020304" pitchFamily="18" charset="0"/>
+                <a:cs typeface="Times New Roman" panose="02020603050405020304" pitchFamily="18" charset="0"/>
+              </a:endParaRPr>
             </a:p>
           </p:txBody>
         </p:sp>
@@ -3656,8 +3635,8 @@
           </p:nvSpPr>
           <p:spPr>
             <a:xfrm>
-              <a:off x="6220760" y="2806788"/>
-              <a:ext cx="904478" cy="369332"/>
+              <a:off x="5716941" y="2707108"/>
+              <a:ext cx="665567" cy="276999"/>
             </a:xfrm>
             <a:prstGeom prst="rect">
               <a:avLst/>
@@ -3671,9 +3650,16 @@
             <a:lstStyle/>
             <a:p>
               <a:r>
-                <a:rPr lang="en-US" dirty="0" smtClean="0"/>
+                <a:rPr lang="en-US" sz="1200" dirty="0" smtClean="0">
+                  <a:latin typeface="Times New Roman" panose="02020603050405020304" pitchFamily="18" charset="0"/>
+                  <a:cs typeface="Times New Roman" panose="02020603050405020304" pitchFamily="18" charset="0"/>
+                </a:rPr>
                 <a:t>Camera</a:t>
               </a:r>
+              <a:endParaRPr lang="en-US" dirty="0" smtClean="0">
+                <a:latin typeface="Times New Roman" panose="02020603050405020304" pitchFamily="18" charset="0"/>
+                <a:cs typeface="Times New Roman" panose="02020603050405020304" pitchFamily="18" charset="0"/>
+              </a:endParaRPr>
             </a:p>
           </p:txBody>
         </p:sp>
@@ -3685,8 +3671,8 @@
           </p:nvSpPr>
           <p:spPr>
             <a:xfrm>
-              <a:off x="5941901" y="3513044"/>
-              <a:ext cx="1183337" cy="369332"/>
+              <a:off x="5521375" y="3500194"/>
+              <a:ext cx="861133" cy="276999"/>
             </a:xfrm>
             <a:prstGeom prst="rect">
               <a:avLst/>
@@ -3700,10 +3686,107 @@
             <a:lstStyle/>
             <a:p>
               <a:r>
-                <a:rPr lang="en-US" dirty="0" smtClean="0"/>
+                <a:rPr lang="en-US" sz="1200" dirty="0" smtClean="0">
+                  <a:latin typeface="Times New Roman" panose="02020603050405020304" pitchFamily="18" charset="0"/>
+                  <a:cs typeface="Times New Roman" panose="02020603050405020304" pitchFamily="18" charset="0"/>
+                </a:rPr>
                 <a:t>Units[mm]</a:t>
               </a:r>
               <a:endParaRPr lang="en-US" dirty="0"/>
+            </a:p>
+          </p:txBody>
+        </p:sp>
+        <p:cxnSp>
+          <p:nvCxnSpPr>
+            <p:cNvPr id="17" name="直線コネクタ 16"/>
+            <p:cNvCxnSpPr/>
+            <p:nvPr/>
+          </p:nvCxnSpPr>
+          <p:spPr>
+            <a:xfrm>
+              <a:off x="4368052" y="3088686"/>
+              <a:ext cx="1280160" cy="0"/>
+            </a:xfrm>
+            <a:prstGeom prst="line">
+              <a:avLst/>
+            </a:prstGeom>
+            <a:ln w="12700">
+              <a:solidFill>
+                <a:schemeClr val="tx1"/>
+              </a:solidFill>
+              <a:prstDash val="dash"/>
+            </a:ln>
+          </p:spPr>
+          <p:style>
+            <a:lnRef idx="1">
+              <a:schemeClr val="accent1"/>
+            </a:lnRef>
+            <a:fillRef idx="0">
+              <a:schemeClr val="accent1"/>
+            </a:fillRef>
+            <a:effectRef idx="0">
+              <a:schemeClr val="accent1"/>
+            </a:effectRef>
+            <a:fontRef idx="minor">
+              <a:schemeClr val="tx1"/>
+            </a:fontRef>
+          </p:style>
+        </p:cxnSp>
+        <p:sp>
+          <p:nvSpPr>
+            <p:cNvPr id="25" name="角丸四角形 24"/>
+            <p:cNvSpPr/>
+            <p:nvPr/>
+          </p:nvSpPr>
+          <p:spPr>
+            <a:xfrm rot="15603807">
+              <a:off x="2687166" y="2173701"/>
+              <a:ext cx="983504" cy="219448"/>
+            </a:xfrm>
+            <a:prstGeom prst="roundRect">
+              <a:avLst/>
+            </a:prstGeom>
+            <a:pattFill prst="pct30">
+              <a:fgClr>
+                <a:schemeClr val="bg1">
+                  <a:lumMod val="50000"/>
+                </a:schemeClr>
+              </a:fgClr>
+              <a:bgClr>
+                <a:schemeClr val="bg1"/>
+              </a:bgClr>
+            </a:pattFill>
+            <a:ln>
+              <a:solidFill>
+                <a:schemeClr val="tx1">
+                  <a:lumMod val="65000"/>
+                  <a:lumOff val="35000"/>
+                </a:schemeClr>
+              </a:solidFill>
+            </a:ln>
+          </p:spPr>
+          <p:style>
+            <a:lnRef idx="2">
+              <a:schemeClr val="accent1">
+                <a:shade val="50000"/>
+              </a:schemeClr>
+            </a:lnRef>
+            <a:fillRef idx="1">
+              <a:schemeClr val="accent1"/>
+            </a:fillRef>
+            <a:effectRef idx="0">
+              <a:schemeClr val="accent1"/>
+            </a:effectRef>
+            <a:fontRef idx="minor">
+              <a:schemeClr val="lt1"/>
+            </a:fontRef>
+          </p:style>
+          <p:txBody>
+            <a:bodyPr rtlCol="0" anchor="ctr"/>
+            <a:lstStyle/>
+            <a:p>
+              <a:pPr algn="ctr"/>
+              <a:endParaRPr lang="en-US"/>
             </a:p>
           </p:txBody>
         </p:sp>
@@ -3718,6 +3801,13 @@
   <p:clrMapOvr>
     <a:masterClrMapping/>
   </p:clrMapOvr>
+  <p:timing>
+    <p:tnLst>
+      <p:par>
+        <p:cTn id="1" dur="indefinite" restart="never" nodeType="tmRoot"/>
+      </p:par>
+    </p:tnLst>
+  </p:timing>
 </p:sld>
 </file>
 
@@ -3740,463 +3830,86 @@
       </p:grpSpPr>
       <p:grpSp>
         <p:nvGrpSpPr>
-          <p:cNvPr id="28" name="グループ化 27"/>
+          <p:cNvPr id="12" name="グループ化 11"/>
           <p:cNvGrpSpPr/>
           <p:nvPr/>
         </p:nvGrpSpPr>
         <p:grpSpPr>
           <a:xfrm>
-            <a:off x="3693907" y="1476132"/>
-            <a:ext cx="4088371" cy="2965649"/>
-            <a:chOff x="3693907" y="1476132"/>
-            <a:chExt cx="4088371" cy="2965649"/>
+            <a:off x="2807224" y="1791673"/>
+            <a:ext cx="2226397" cy="2589189"/>
+            <a:chOff x="2807224" y="1791673"/>
+            <a:chExt cx="2226397" cy="2589189"/>
           </a:xfrm>
         </p:grpSpPr>
-        <p:grpSp>
-          <p:nvGrpSpPr>
-            <p:cNvPr id="27" name="グループ化 26"/>
-            <p:cNvGrpSpPr/>
-            <p:nvPr/>
-          </p:nvGrpSpPr>
-          <p:grpSpPr>
-            <a:xfrm>
-              <a:off x="3693907" y="1476132"/>
-              <a:ext cx="2611213" cy="2965649"/>
-              <a:chOff x="2718547" y="1152735"/>
-              <a:chExt cx="2611213" cy="2965649"/>
-            </a:xfrm>
-          </p:grpSpPr>
-          <p:grpSp>
-            <p:nvGrpSpPr>
-              <p:cNvPr id="26" name="グループ化 25"/>
-              <p:cNvGrpSpPr/>
-              <p:nvPr/>
-            </p:nvGrpSpPr>
-            <p:grpSpPr>
-              <a:xfrm>
-                <a:off x="2718547" y="1152735"/>
-                <a:ext cx="2611213" cy="2585622"/>
-                <a:chOff x="2718547" y="1152735"/>
-                <a:chExt cx="2611213" cy="2585622"/>
-              </a:xfrm>
-            </p:grpSpPr>
-            <p:sp>
-              <p:nvSpPr>
-                <p:cNvPr id="4" name="角丸四角形 3"/>
-                <p:cNvSpPr/>
-                <p:nvPr/>
-              </p:nvSpPr>
-              <p:spPr>
-                <a:xfrm>
-                  <a:off x="2718547" y="2737597"/>
-                  <a:ext cx="1649506" cy="699247"/>
-                </a:xfrm>
-                <a:prstGeom prst="roundRect">
-                  <a:avLst/>
-                </a:prstGeom>
-              </p:spPr>
-              <p:style>
-                <a:lnRef idx="2">
-                  <a:schemeClr val="accent1">
-                    <a:shade val="50000"/>
-                  </a:schemeClr>
-                </a:lnRef>
-                <a:fillRef idx="1">
-                  <a:schemeClr val="accent1"/>
-                </a:fillRef>
-                <a:effectRef idx="0">
-                  <a:schemeClr val="accent1"/>
-                </a:effectRef>
-                <a:fontRef idx="minor">
-                  <a:schemeClr val="lt1"/>
-                </a:fontRef>
-              </p:style>
-              <p:txBody>
-                <a:bodyPr rtlCol="0" anchor="ctr"/>
-                <a:lstStyle/>
-                <a:p>
-                  <a:pPr algn="ctr"/>
-                  <a:endParaRPr lang="en-US"/>
-                </a:p>
-              </p:txBody>
-            </p:sp>
-            <p:sp>
-              <p:nvSpPr>
-                <p:cNvPr id="5" name="角丸四角形 4"/>
-                <p:cNvSpPr/>
-                <p:nvPr/>
-              </p:nvSpPr>
-              <p:spPr>
-                <a:xfrm rot="21024751">
-                  <a:off x="2813908" y="1610285"/>
-                  <a:ext cx="242047" cy="1165412"/>
-                </a:xfrm>
-                <a:prstGeom prst="roundRect">
-                  <a:avLst/>
-                </a:prstGeom>
-              </p:spPr>
-              <p:style>
-                <a:lnRef idx="2">
-                  <a:schemeClr val="accent1">
-                    <a:shade val="50000"/>
-                  </a:schemeClr>
-                </a:lnRef>
-                <a:fillRef idx="1">
-                  <a:schemeClr val="accent1"/>
-                </a:fillRef>
-                <a:effectRef idx="0">
-                  <a:schemeClr val="accent1"/>
-                </a:effectRef>
-                <a:fontRef idx="minor">
-                  <a:schemeClr val="lt1"/>
-                </a:fontRef>
-              </p:style>
-              <p:txBody>
-                <a:bodyPr rtlCol="0" anchor="ctr"/>
-                <a:lstStyle/>
-                <a:p>
-                  <a:pPr algn="ctr"/>
-                  <a:endParaRPr lang="en-US"/>
-                </a:p>
-              </p:txBody>
-            </p:sp>
-            <p:sp>
-              <p:nvSpPr>
-                <p:cNvPr id="6" name="テキスト ボックス 5"/>
-                <p:cNvSpPr txBox="1"/>
-                <p:nvPr/>
-              </p:nvSpPr>
-              <p:spPr>
-                <a:xfrm>
-                  <a:off x="2934931" y="1152735"/>
-                  <a:ext cx="1208792" cy="369332"/>
-                </a:xfrm>
-                <a:prstGeom prst="rect">
-                  <a:avLst/>
-                </a:prstGeom>
-                <a:noFill/>
-              </p:spPr>
-              <p:txBody>
-                <a:bodyPr wrap="none" rtlCol="0">
-                  <a:spAutoFit/>
-                </a:bodyPr>
-                <a:lstStyle/>
-                <a:p>
-                  <a:r>
-                    <a:rPr lang="en-US" dirty="0" smtClean="0"/>
-                    <a:t>Toilet bowl</a:t>
-                  </a:r>
-                </a:p>
-              </p:txBody>
-            </p:sp>
-            <p:grpSp>
-              <p:nvGrpSpPr>
-                <p:cNvPr id="7" name="グループ化 6"/>
-                <p:cNvGrpSpPr/>
-                <p:nvPr/>
-              </p:nvGrpSpPr>
-              <p:grpSpPr>
-                <a:xfrm rot="16200000">
-                  <a:off x="4405339" y="2440977"/>
-                  <a:ext cx="322730" cy="260350"/>
-                  <a:chOff x="6052110" y="2671295"/>
-                  <a:chExt cx="322730" cy="260350"/>
-                </a:xfrm>
-              </p:grpSpPr>
-              <p:sp>
-                <p:nvSpPr>
-                  <p:cNvPr id="8" name="正方形/長方形 7"/>
-                  <p:cNvSpPr/>
-                  <p:nvPr/>
-                </p:nvSpPr>
-                <p:spPr>
-                  <a:xfrm>
-                    <a:off x="6114490" y="2712570"/>
-                    <a:ext cx="260350" cy="177800"/>
-                  </a:xfrm>
-                  <a:prstGeom prst="rect">
-                    <a:avLst/>
-                  </a:prstGeom>
-                </p:spPr>
-                <p:style>
-                  <a:lnRef idx="2">
-                    <a:schemeClr val="accent1">
-                      <a:shade val="50000"/>
-                    </a:schemeClr>
-                  </a:lnRef>
-                  <a:fillRef idx="1">
-                    <a:schemeClr val="accent1"/>
-                  </a:fillRef>
-                  <a:effectRef idx="0">
-                    <a:schemeClr val="accent1"/>
-                  </a:effectRef>
-                  <a:fontRef idx="minor">
-                    <a:schemeClr val="lt1"/>
-                  </a:fontRef>
-                </p:style>
-                <p:txBody>
-                  <a:bodyPr rtlCol="0" anchor="ctr"/>
-                  <a:lstStyle/>
-                  <a:p>
-                    <a:pPr algn="ctr"/>
-                    <a:endParaRPr lang="en-US"/>
-                  </a:p>
-                </p:txBody>
-              </p:sp>
-              <p:sp>
-                <p:nvSpPr>
-                  <p:cNvPr id="9" name="二等辺三角形 8"/>
-                  <p:cNvSpPr/>
-                  <p:nvPr/>
-                </p:nvSpPr>
-                <p:spPr>
-                  <a:xfrm rot="5400000">
-                    <a:off x="5953125" y="2770280"/>
-                    <a:ext cx="260350" cy="62380"/>
-                  </a:xfrm>
-                  <a:prstGeom prst="triangle">
-                    <a:avLst/>
-                  </a:prstGeom>
-                </p:spPr>
-                <p:style>
-                  <a:lnRef idx="2">
-                    <a:schemeClr val="accent1">
-                      <a:shade val="50000"/>
-                    </a:schemeClr>
-                  </a:lnRef>
-                  <a:fillRef idx="1">
-                    <a:schemeClr val="accent1"/>
-                  </a:fillRef>
-                  <a:effectRef idx="0">
-                    <a:schemeClr val="accent1"/>
-                  </a:effectRef>
-                  <a:fontRef idx="minor">
-                    <a:schemeClr val="lt1"/>
-                  </a:fontRef>
-                </p:style>
-                <p:txBody>
-                  <a:bodyPr rtlCol="0" anchor="ctr"/>
-                  <a:lstStyle/>
-                  <a:p>
-                    <a:pPr algn="ctr"/>
-                    <a:endParaRPr lang="en-US"/>
-                  </a:p>
-                </p:txBody>
-              </p:sp>
-            </p:grpSp>
-            <p:sp>
-              <p:nvSpPr>
-                <p:cNvPr id="10" name="テキスト ボックス 9"/>
-                <p:cNvSpPr txBox="1"/>
-                <p:nvPr/>
-              </p:nvSpPr>
-              <p:spPr>
-                <a:xfrm>
-                  <a:off x="4143723" y="1983156"/>
-                  <a:ext cx="904478" cy="369332"/>
-                </a:xfrm>
-                <a:prstGeom prst="rect">
-                  <a:avLst/>
-                </a:prstGeom>
-                <a:noFill/>
-              </p:spPr>
-              <p:txBody>
-                <a:bodyPr wrap="none" rtlCol="0">
-                  <a:spAutoFit/>
-                </a:bodyPr>
-                <a:lstStyle/>
-                <a:p>
-                  <a:r>
-                    <a:rPr lang="en-US" dirty="0" smtClean="0"/>
-                    <a:t>Camera</a:t>
-                  </a:r>
-                </a:p>
-              </p:txBody>
-            </p:sp>
-            <p:cxnSp>
-              <p:nvCxnSpPr>
-                <p:cNvPr id="11" name="直線コネクタ 10"/>
-                <p:cNvCxnSpPr/>
-                <p:nvPr/>
-              </p:nvCxnSpPr>
-              <p:spPr>
-                <a:xfrm flipV="1">
-                  <a:off x="3862163" y="2737595"/>
-                  <a:ext cx="1467597" cy="1"/>
-                </a:xfrm>
-                <a:prstGeom prst="line">
-                  <a:avLst/>
-                </a:prstGeom>
-                <a:ln>
-                  <a:solidFill>
-                    <a:schemeClr val="tx1"/>
-                  </a:solidFill>
-                  <a:prstDash val="dash"/>
-                </a:ln>
-              </p:spPr>
-              <p:style>
-                <a:lnRef idx="1">
-                  <a:schemeClr val="accent1"/>
-                </a:lnRef>
-                <a:fillRef idx="0">
-                  <a:schemeClr val="accent1"/>
-                </a:fillRef>
-                <a:effectRef idx="0">
-                  <a:schemeClr val="accent1"/>
-                </a:effectRef>
-                <a:fontRef idx="minor">
-                  <a:schemeClr val="tx1"/>
-                </a:fontRef>
-              </p:style>
-            </p:cxnSp>
-            <p:cxnSp>
-              <p:nvCxnSpPr>
-                <p:cNvPr id="13" name="直線コネクタ 12"/>
-                <p:cNvCxnSpPr>
-                  <a:stCxn id="9" idx="3"/>
-                </p:cNvCxnSpPr>
-                <p:nvPr/>
-              </p:nvCxnSpPr>
-              <p:spPr>
-                <a:xfrm>
-                  <a:off x="4566704" y="2732517"/>
-                  <a:ext cx="0" cy="1005840"/>
-                </a:xfrm>
-                <a:prstGeom prst="line">
-                  <a:avLst/>
-                </a:prstGeom>
-                <a:ln>
-                  <a:solidFill>
-                    <a:schemeClr val="tx1"/>
-                  </a:solidFill>
-                </a:ln>
-              </p:spPr>
-              <p:style>
-                <a:lnRef idx="1">
-                  <a:schemeClr val="accent1"/>
-                </a:lnRef>
-                <a:fillRef idx="0">
-                  <a:schemeClr val="accent1"/>
-                </a:fillRef>
-                <a:effectRef idx="0">
-                  <a:schemeClr val="accent1"/>
-                </a:effectRef>
-                <a:fontRef idx="minor">
-                  <a:schemeClr val="tx1"/>
-                </a:fontRef>
-              </p:style>
-            </p:cxnSp>
-            <p:cxnSp>
-              <p:nvCxnSpPr>
-                <p:cNvPr id="16" name="直線コネクタ 15"/>
-                <p:cNvCxnSpPr/>
-                <p:nvPr/>
-              </p:nvCxnSpPr>
-              <p:spPr>
-                <a:xfrm>
-                  <a:off x="4368053" y="2732516"/>
-                  <a:ext cx="0" cy="1005840"/>
-                </a:xfrm>
-                <a:prstGeom prst="line">
-                  <a:avLst/>
-                </a:prstGeom>
-                <a:ln>
-                  <a:solidFill>
-                    <a:schemeClr val="tx1"/>
-                  </a:solidFill>
-                </a:ln>
-              </p:spPr>
-              <p:style>
-                <a:lnRef idx="1">
-                  <a:schemeClr val="accent1"/>
-                </a:lnRef>
-                <a:fillRef idx="0">
-                  <a:schemeClr val="accent1"/>
-                </a:fillRef>
-                <a:effectRef idx="0">
-                  <a:schemeClr val="accent1"/>
-                </a:effectRef>
-                <a:fontRef idx="minor">
-                  <a:schemeClr val="tx1"/>
-                </a:fontRef>
-              </p:style>
-            </p:cxnSp>
-            <p:cxnSp>
-              <p:nvCxnSpPr>
-                <p:cNvPr id="18" name="直線コネクタ 17"/>
-                <p:cNvCxnSpPr/>
-                <p:nvPr/>
-              </p:nvCxnSpPr>
-              <p:spPr>
-                <a:xfrm flipV="1">
-                  <a:off x="4368053" y="3708400"/>
-                  <a:ext cx="198651" cy="0"/>
-                </a:xfrm>
-                <a:prstGeom prst="line">
-                  <a:avLst/>
-                </a:prstGeom>
-                <a:ln>
-                  <a:solidFill>
-                    <a:schemeClr val="tx1"/>
-                  </a:solidFill>
-                </a:ln>
-              </p:spPr>
-              <p:style>
-                <a:lnRef idx="1">
-                  <a:schemeClr val="accent1"/>
-                </a:lnRef>
-                <a:fillRef idx="0">
-                  <a:schemeClr val="accent1"/>
-                </a:fillRef>
-                <a:effectRef idx="0">
-                  <a:schemeClr val="accent1"/>
-                </a:effectRef>
-                <a:fontRef idx="minor">
-                  <a:schemeClr val="tx1"/>
-                </a:fontRef>
-              </p:style>
-            </p:cxnSp>
-          </p:grpSp>
-          <p:sp>
-            <p:nvSpPr>
-              <p:cNvPr id="24" name="テキスト ボックス 23"/>
-              <p:cNvSpPr txBox="1"/>
-              <p:nvPr/>
-            </p:nvSpPr>
-            <p:spPr>
-              <a:xfrm>
-                <a:off x="4236900" y="3749052"/>
-                <a:ext cx="418704" cy="369332"/>
-              </a:xfrm>
-              <a:prstGeom prst="rect">
-                <a:avLst/>
-              </a:prstGeom>
-              <a:noFill/>
-            </p:spPr>
-            <p:txBody>
-              <a:bodyPr wrap="none" rtlCol="0">
-                <a:spAutoFit/>
-              </a:bodyPr>
-              <a:lstStyle/>
-              <a:p>
-                <a:r>
-                  <a:rPr lang="en-US" dirty="0" smtClean="0"/>
-                  <a:t>75</a:t>
-                </a:r>
-              </a:p>
-            </p:txBody>
-          </p:sp>
-        </p:grpSp>
         <p:sp>
           <p:nvSpPr>
-            <p:cNvPr id="25" name="テキスト ボックス 24"/>
+            <p:cNvPr id="51" name="角丸四角形 50"/>
+            <p:cNvSpPr/>
+            <p:nvPr/>
+          </p:nvSpPr>
+          <p:spPr>
+            <a:xfrm>
+              <a:off x="2807224" y="2763747"/>
+              <a:ext cx="1554480" cy="640080"/>
+            </a:xfrm>
+            <a:prstGeom prst="roundRect">
+              <a:avLst/>
+            </a:prstGeom>
+            <a:pattFill prst="pct30">
+              <a:fgClr>
+                <a:schemeClr val="bg1">
+                  <a:lumMod val="50000"/>
+                </a:schemeClr>
+              </a:fgClr>
+              <a:bgClr>
+                <a:schemeClr val="bg1"/>
+              </a:bgClr>
+            </a:pattFill>
+            <a:ln>
+              <a:solidFill>
+                <a:schemeClr val="tx1">
+                  <a:lumMod val="65000"/>
+                  <a:lumOff val="35000"/>
+                </a:schemeClr>
+              </a:solidFill>
+            </a:ln>
+          </p:spPr>
+          <p:style>
+            <a:lnRef idx="2">
+              <a:schemeClr val="accent1">
+                <a:shade val="50000"/>
+              </a:schemeClr>
+            </a:lnRef>
+            <a:fillRef idx="1">
+              <a:schemeClr val="accent1"/>
+            </a:fillRef>
+            <a:effectRef idx="0">
+              <a:schemeClr val="accent1"/>
+            </a:effectRef>
+            <a:fontRef idx="minor">
+              <a:schemeClr val="lt1"/>
+            </a:fontRef>
+          </p:style>
+          <p:txBody>
+            <a:bodyPr rtlCol="0" anchor="ctr"/>
+            <a:lstStyle/>
+            <a:p>
+              <a:pPr algn="ctr"/>
+              <a:endParaRPr lang="en-US"/>
+            </a:p>
+          </p:txBody>
+        </p:sp>
+        <p:sp>
+          <p:nvSpPr>
+            <p:cNvPr id="52" name="テキスト ボックス 51"/>
             <p:cNvSpPr txBox="1"/>
             <p:nvPr/>
           </p:nvSpPr>
           <p:spPr>
             <a:xfrm>
-              <a:off x="6598941" y="4031797"/>
-              <a:ext cx="1183337" cy="369332"/>
+              <a:off x="3371852" y="1869656"/>
+              <a:ext cx="890437" cy="276999"/>
             </a:xfrm>
             <a:prstGeom prst="rect">
               <a:avLst/>
@@ -4210,13 +3923,518 @@
             <a:lstStyle/>
             <a:p>
               <a:r>
-                <a:rPr lang="en-US" dirty="0" smtClean="0"/>
+                <a:rPr lang="en-US" sz="1200" dirty="0" smtClean="0">
+                  <a:latin typeface="Times New Roman" panose="02020603050405020304" pitchFamily="18" charset="0"/>
+                  <a:cs typeface="Times New Roman" panose="02020603050405020304" pitchFamily="18" charset="0"/>
+                </a:rPr>
+                <a:t>Toilet bowl</a:t>
+              </a:r>
+              <a:endParaRPr lang="en-US" sz="1200" dirty="0" smtClean="0">
+                <a:latin typeface="Times New Roman" panose="02020603050405020304" pitchFamily="18" charset="0"/>
+                <a:cs typeface="Times New Roman" panose="02020603050405020304" pitchFamily="18" charset="0"/>
+              </a:endParaRPr>
+            </a:p>
+          </p:txBody>
+        </p:sp>
+        <p:grpSp>
+          <p:nvGrpSpPr>
+            <p:cNvPr id="53" name="グループ化 52"/>
+            <p:cNvGrpSpPr/>
+            <p:nvPr/>
+          </p:nvGrpSpPr>
+          <p:grpSpPr>
+            <a:xfrm rot="16200000">
+              <a:off x="4389569" y="2459675"/>
+              <a:ext cx="322730" cy="260350"/>
+              <a:chOff x="6052110" y="2671295"/>
+              <a:chExt cx="322730" cy="260350"/>
+            </a:xfrm>
+            <a:pattFill prst="pct70">
+              <a:fgClr>
+                <a:schemeClr val="bg1">
+                  <a:lumMod val="50000"/>
+                </a:schemeClr>
+              </a:fgClr>
+              <a:bgClr>
+                <a:schemeClr val="bg1"/>
+              </a:bgClr>
+            </a:pattFill>
+          </p:grpSpPr>
+          <p:sp>
+            <p:nvSpPr>
+              <p:cNvPr id="54" name="正方形/長方形 53"/>
+              <p:cNvSpPr/>
+              <p:nvPr/>
+            </p:nvSpPr>
+            <p:spPr>
+              <a:xfrm>
+                <a:off x="6114490" y="2712570"/>
+                <a:ext cx="260350" cy="177800"/>
+              </a:xfrm>
+              <a:prstGeom prst="rect">
+                <a:avLst/>
+              </a:prstGeom>
+              <a:grpFill/>
+              <a:ln>
+                <a:solidFill>
+                  <a:schemeClr val="tx1"/>
+                </a:solidFill>
+              </a:ln>
+            </p:spPr>
+            <p:style>
+              <a:lnRef idx="2">
+                <a:schemeClr val="accent1">
+                  <a:shade val="50000"/>
+                </a:schemeClr>
+              </a:lnRef>
+              <a:fillRef idx="1">
+                <a:schemeClr val="accent1"/>
+              </a:fillRef>
+              <a:effectRef idx="0">
+                <a:schemeClr val="accent1"/>
+              </a:effectRef>
+              <a:fontRef idx="minor">
+                <a:schemeClr val="lt1"/>
+              </a:fontRef>
+            </p:style>
+            <p:txBody>
+              <a:bodyPr rtlCol="0" anchor="ctr"/>
+              <a:lstStyle/>
+              <a:p>
+                <a:pPr algn="ctr"/>
+                <a:endParaRPr lang="en-US"/>
+              </a:p>
+            </p:txBody>
+          </p:sp>
+          <p:sp>
+            <p:nvSpPr>
+              <p:cNvPr id="55" name="二等辺三角形 54"/>
+              <p:cNvSpPr/>
+              <p:nvPr/>
+            </p:nvSpPr>
+            <p:spPr>
+              <a:xfrm rot="5400000">
+                <a:off x="5953125" y="2770280"/>
+                <a:ext cx="260350" cy="62380"/>
+              </a:xfrm>
+              <a:prstGeom prst="triangle">
+                <a:avLst/>
+              </a:prstGeom>
+              <a:grpFill/>
+              <a:ln>
+                <a:solidFill>
+                  <a:schemeClr val="tx1"/>
+                </a:solidFill>
+              </a:ln>
+            </p:spPr>
+            <p:style>
+              <a:lnRef idx="2">
+                <a:schemeClr val="accent1">
+                  <a:shade val="50000"/>
+                </a:schemeClr>
+              </a:lnRef>
+              <a:fillRef idx="1">
+                <a:schemeClr val="accent1"/>
+              </a:fillRef>
+              <a:effectRef idx="0">
+                <a:schemeClr val="accent1"/>
+              </a:effectRef>
+              <a:fontRef idx="minor">
+                <a:schemeClr val="lt1"/>
+              </a:fontRef>
+            </p:style>
+            <p:txBody>
+              <a:bodyPr rtlCol="0" anchor="ctr"/>
+              <a:lstStyle/>
+              <a:p>
+                <a:pPr algn="ctr"/>
+                <a:endParaRPr lang="en-US"/>
+              </a:p>
+            </p:txBody>
+          </p:sp>
+        </p:grpSp>
+        <p:cxnSp>
+          <p:nvCxnSpPr>
+            <p:cNvPr id="56" name="直線コネクタ 55"/>
+            <p:cNvCxnSpPr/>
+            <p:nvPr/>
+          </p:nvCxnSpPr>
+          <p:spPr>
+            <a:xfrm flipV="1">
+              <a:off x="4368053" y="2755392"/>
+              <a:ext cx="0" cy="1048497"/>
+            </a:xfrm>
+            <a:prstGeom prst="line">
+              <a:avLst/>
+            </a:prstGeom>
+            <a:ln>
+              <a:solidFill>
+                <a:schemeClr val="tx1"/>
+              </a:solidFill>
+            </a:ln>
+          </p:spPr>
+          <p:style>
+            <a:lnRef idx="1">
+              <a:schemeClr val="accent1"/>
+            </a:lnRef>
+            <a:fillRef idx="0">
+              <a:schemeClr val="accent1"/>
+            </a:fillRef>
+            <a:effectRef idx="0">
+              <a:schemeClr val="accent1"/>
+            </a:effectRef>
+            <a:fontRef idx="minor">
+              <a:schemeClr val="tx1"/>
+            </a:fontRef>
+          </p:style>
+        </p:cxnSp>
+        <p:cxnSp>
+          <p:nvCxnSpPr>
+            <p:cNvPr id="57" name="直線コネクタ 56"/>
+            <p:cNvCxnSpPr/>
+            <p:nvPr/>
+          </p:nvCxnSpPr>
+          <p:spPr>
+            <a:xfrm flipV="1">
+              <a:off x="4555433" y="2755392"/>
+              <a:ext cx="0" cy="1048497"/>
+            </a:xfrm>
+            <a:prstGeom prst="line">
+              <a:avLst/>
+            </a:prstGeom>
+            <a:ln>
+              <a:solidFill>
+                <a:schemeClr val="tx1"/>
+              </a:solidFill>
+            </a:ln>
+          </p:spPr>
+          <p:style>
+            <a:lnRef idx="1">
+              <a:schemeClr val="accent1"/>
+            </a:lnRef>
+            <a:fillRef idx="0">
+              <a:schemeClr val="accent1"/>
+            </a:fillRef>
+            <a:effectRef idx="0">
+              <a:schemeClr val="accent1"/>
+            </a:effectRef>
+            <a:fontRef idx="minor">
+              <a:schemeClr val="tx1"/>
+            </a:fontRef>
+          </p:style>
+        </p:cxnSp>
+        <p:cxnSp>
+          <p:nvCxnSpPr>
+            <p:cNvPr id="58" name="直線コネクタ 57"/>
+            <p:cNvCxnSpPr/>
+            <p:nvPr/>
+          </p:nvCxnSpPr>
+          <p:spPr>
+            <a:xfrm>
+              <a:off x="4368054" y="3720818"/>
+              <a:ext cx="182880" cy="0"/>
+            </a:xfrm>
+            <a:prstGeom prst="line">
+              <a:avLst/>
+            </a:prstGeom>
+            <a:ln w="6350">
+              <a:solidFill>
+                <a:schemeClr val="tx1"/>
+              </a:solidFill>
+              <a:headEnd type="none" w="med" len="med"/>
+              <a:tailEnd type="none" w="med" len="med"/>
+            </a:ln>
+          </p:spPr>
+          <p:style>
+            <a:lnRef idx="1">
+              <a:schemeClr val="accent1"/>
+            </a:lnRef>
+            <a:fillRef idx="0">
+              <a:schemeClr val="accent1"/>
+            </a:fillRef>
+            <a:effectRef idx="0">
+              <a:schemeClr val="accent1"/>
+            </a:effectRef>
+            <a:fontRef idx="minor">
+              <a:schemeClr val="tx1"/>
+            </a:fontRef>
+          </p:style>
+        </p:cxnSp>
+        <p:sp>
+          <p:nvSpPr>
+            <p:cNvPr id="59" name="テキスト ボックス 58"/>
+            <p:cNvSpPr txBox="1"/>
+            <p:nvPr/>
+          </p:nvSpPr>
+          <p:spPr>
+            <a:xfrm>
+              <a:off x="4287845" y="3766984"/>
+              <a:ext cx="338554" cy="276999"/>
+            </a:xfrm>
+            <a:prstGeom prst="rect">
+              <a:avLst/>
+            </a:prstGeom>
+            <a:noFill/>
+          </p:spPr>
+          <p:txBody>
+            <a:bodyPr wrap="none" rtlCol="0">
+              <a:spAutoFit/>
+            </a:bodyPr>
+            <a:lstStyle/>
+            <a:p>
+              <a:r>
+                <a:rPr lang="en-US" sz="1200" dirty="0" smtClean="0">
+                  <a:latin typeface="Times New Roman" panose="02020603050405020304" pitchFamily="18" charset="0"/>
+                  <a:cs typeface="Times New Roman" panose="02020603050405020304" pitchFamily="18" charset="0"/>
+                </a:rPr>
+                <a:t>75</a:t>
+              </a:r>
+              <a:endParaRPr lang="en-US" sz="1200" dirty="0">
+                <a:latin typeface="Times New Roman" panose="02020603050405020304" pitchFamily="18" charset="0"/>
+                <a:cs typeface="Times New Roman" panose="02020603050405020304" pitchFamily="18" charset="0"/>
+              </a:endParaRPr>
+            </a:p>
+          </p:txBody>
+        </p:sp>
+        <p:sp>
+          <p:nvSpPr>
+            <p:cNvPr id="60" name="テキスト ボックス 59"/>
+            <p:cNvSpPr txBox="1"/>
+            <p:nvPr/>
+          </p:nvSpPr>
+          <p:spPr>
+            <a:xfrm>
+              <a:off x="4368054" y="2151894"/>
+              <a:ext cx="665567" cy="276999"/>
+            </a:xfrm>
+            <a:prstGeom prst="rect">
+              <a:avLst/>
+            </a:prstGeom>
+            <a:noFill/>
+          </p:spPr>
+          <p:txBody>
+            <a:bodyPr wrap="none" rtlCol="0">
+              <a:spAutoFit/>
+            </a:bodyPr>
+            <a:lstStyle/>
+            <a:p>
+              <a:r>
+                <a:rPr lang="en-US" sz="1200" dirty="0" smtClean="0">
+                  <a:latin typeface="Times New Roman" panose="02020603050405020304" pitchFamily="18" charset="0"/>
+                  <a:cs typeface="Times New Roman" panose="02020603050405020304" pitchFamily="18" charset="0"/>
+                </a:rPr>
+                <a:t>Camera</a:t>
+              </a:r>
+              <a:endParaRPr lang="en-US" dirty="0" smtClean="0">
+                <a:latin typeface="Times New Roman" panose="02020603050405020304" pitchFamily="18" charset="0"/>
+                <a:cs typeface="Times New Roman" panose="02020603050405020304" pitchFamily="18" charset="0"/>
+              </a:endParaRPr>
+            </a:p>
+          </p:txBody>
+        </p:sp>
+        <p:sp>
+          <p:nvSpPr>
+            <p:cNvPr id="61" name="テキスト ボックス 60"/>
+            <p:cNvSpPr txBox="1"/>
+            <p:nvPr/>
+          </p:nvSpPr>
+          <p:spPr>
+            <a:xfrm>
+              <a:off x="4169989" y="4103863"/>
+              <a:ext cx="861133" cy="276999"/>
+            </a:xfrm>
+            <a:prstGeom prst="rect">
+              <a:avLst/>
+            </a:prstGeom>
+            <a:noFill/>
+          </p:spPr>
+          <p:txBody>
+            <a:bodyPr wrap="none" rtlCol="0">
+              <a:spAutoFit/>
+            </a:bodyPr>
+            <a:lstStyle/>
+            <a:p>
+              <a:r>
+                <a:rPr lang="en-US" sz="1200" dirty="0" smtClean="0">
+                  <a:latin typeface="Times New Roman" panose="02020603050405020304" pitchFamily="18" charset="0"/>
+                  <a:cs typeface="Times New Roman" panose="02020603050405020304" pitchFamily="18" charset="0"/>
+                </a:rPr>
                 <a:t>Units[mm]</a:t>
               </a:r>
               <a:endParaRPr lang="en-US" dirty="0"/>
             </a:p>
           </p:txBody>
         </p:sp>
+        <p:cxnSp>
+          <p:nvCxnSpPr>
+            <p:cNvPr id="62" name="直線コネクタ 61"/>
+            <p:cNvCxnSpPr>
+              <a:stCxn id="51" idx="0"/>
+            </p:cNvCxnSpPr>
+            <p:nvPr/>
+          </p:nvCxnSpPr>
+          <p:spPr>
+            <a:xfrm>
+              <a:off x="3584464" y="2763747"/>
+              <a:ext cx="966470" cy="0"/>
+            </a:xfrm>
+            <a:prstGeom prst="line">
+              <a:avLst/>
+            </a:prstGeom>
+            <a:ln w="12700">
+              <a:solidFill>
+                <a:schemeClr val="tx1"/>
+              </a:solidFill>
+              <a:prstDash val="dash"/>
+            </a:ln>
+          </p:spPr>
+          <p:style>
+            <a:lnRef idx="1">
+              <a:schemeClr val="accent1"/>
+            </a:lnRef>
+            <a:fillRef idx="0">
+              <a:schemeClr val="accent1"/>
+            </a:fillRef>
+            <a:effectRef idx="0">
+              <a:schemeClr val="accent1"/>
+            </a:effectRef>
+            <a:fontRef idx="minor">
+              <a:schemeClr val="tx1"/>
+            </a:fontRef>
+          </p:style>
+        </p:cxnSp>
+        <p:sp>
+          <p:nvSpPr>
+            <p:cNvPr id="63" name="角丸四角形 62"/>
+            <p:cNvSpPr/>
+            <p:nvPr/>
+          </p:nvSpPr>
+          <p:spPr>
+            <a:xfrm rot="15603807">
+              <a:off x="2687166" y="2173701"/>
+              <a:ext cx="983504" cy="219448"/>
+            </a:xfrm>
+            <a:prstGeom prst="roundRect">
+              <a:avLst/>
+            </a:prstGeom>
+            <a:pattFill prst="pct30">
+              <a:fgClr>
+                <a:schemeClr val="bg1">
+                  <a:lumMod val="50000"/>
+                </a:schemeClr>
+              </a:fgClr>
+              <a:bgClr>
+                <a:schemeClr val="bg1"/>
+              </a:bgClr>
+            </a:pattFill>
+            <a:ln>
+              <a:solidFill>
+                <a:schemeClr val="tx1">
+                  <a:lumMod val="65000"/>
+                  <a:lumOff val="35000"/>
+                </a:schemeClr>
+              </a:solidFill>
+            </a:ln>
+          </p:spPr>
+          <p:style>
+            <a:lnRef idx="2">
+              <a:schemeClr val="accent1">
+                <a:shade val="50000"/>
+              </a:schemeClr>
+            </a:lnRef>
+            <a:fillRef idx="1">
+              <a:schemeClr val="accent1"/>
+            </a:fillRef>
+            <a:effectRef idx="0">
+              <a:schemeClr val="accent1"/>
+            </a:effectRef>
+            <a:fontRef idx="minor">
+              <a:schemeClr val="lt1"/>
+            </a:fontRef>
+          </p:style>
+          <p:txBody>
+            <a:bodyPr rtlCol="0" anchor="ctr"/>
+            <a:lstStyle/>
+            <a:p>
+              <a:pPr algn="ctr"/>
+              <a:endParaRPr lang="en-US"/>
+            </a:p>
+          </p:txBody>
+        </p:sp>
+        <p:cxnSp>
+          <p:nvCxnSpPr>
+            <p:cNvPr id="64" name="直線コネクタ 63"/>
+            <p:cNvCxnSpPr/>
+            <p:nvPr/>
+          </p:nvCxnSpPr>
+          <p:spPr>
+            <a:xfrm>
+              <a:off x="4550934" y="3720818"/>
+              <a:ext cx="91440" cy="0"/>
+            </a:xfrm>
+            <a:prstGeom prst="line">
+              <a:avLst/>
+            </a:prstGeom>
+            <a:ln w="6350">
+              <a:solidFill>
+                <a:schemeClr val="tx1"/>
+              </a:solidFill>
+              <a:headEnd type="arrow" w="med" len="med"/>
+              <a:tailEnd type="none" w="med" len="med"/>
+            </a:ln>
+          </p:spPr>
+          <p:style>
+            <a:lnRef idx="1">
+              <a:schemeClr val="accent1"/>
+            </a:lnRef>
+            <a:fillRef idx="0">
+              <a:schemeClr val="accent1"/>
+            </a:fillRef>
+            <a:effectRef idx="0">
+              <a:schemeClr val="accent1"/>
+            </a:effectRef>
+            <a:fontRef idx="minor">
+              <a:schemeClr val="tx1"/>
+            </a:fontRef>
+          </p:style>
+        </p:cxnSp>
+        <p:cxnSp>
+          <p:nvCxnSpPr>
+            <p:cNvPr id="65" name="直線コネクタ 64"/>
+            <p:cNvCxnSpPr/>
+            <p:nvPr/>
+          </p:nvCxnSpPr>
+          <p:spPr>
+            <a:xfrm>
+              <a:off x="4276614" y="3720818"/>
+              <a:ext cx="91440" cy="0"/>
+            </a:xfrm>
+            <a:prstGeom prst="line">
+              <a:avLst/>
+            </a:prstGeom>
+            <a:ln w="6350">
+              <a:solidFill>
+                <a:schemeClr val="tx1"/>
+              </a:solidFill>
+              <a:headEnd type="none" w="med" len="med"/>
+              <a:tailEnd type="arrow" w="med" len="med"/>
+            </a:ln>
+          </p:spPr>
+          <p:style>
+            <a:lnRef idx="1">
+              <a:schemeClr val="accent1"/>
+            </a:lnRef>
+            <a:fillRef idx="0">
+              <a:schemeClr val="accent1"/>
+            </a:fillRef>
+            <a:effectRef idx="0">
+              <a:schemeClr val="accent1"/>
+            </a:effectRef>
+            <a:fontRef idx="minor">
+              <a:schemeClr val="tx1"/>
+            </a:fontRef>
+          </p:style>
+        </p:cxnSp>
       </p:grpSp>
     </p:spTree>
     <p:extLst>
@@ -4228,6 +4446,13 @@
   <p:clrMapOvr>
     <a:masterClrMapping/>
   </p:clrMapOvr>
+  <p:timing>
+    <p:tnLst>
+      <p:par>
+        <p:cTn id="1" dur="indefinite" restart="never" nodeType="tmRoot"/>
+      </p:par>
+    </p:tnLst>
+  </p:timing>
 </p:sld>
 </file>
 
@@ -4250,32 +4475,50 @@
       </p:grpSpPr>
       <p:grpSp>
         <p:nvGrpSpPr>
-          <p:cNvPr id="42" name="グループ化 41"/>
+          <p:cNvPr id="84" name="グループ化 83"/>
           <p:cNvGrpSpPr/>
           <p:nvPr/>
         </p:nvGrpSpPr>
         <p:grpSpPr>
           <a:xfrm>
-            <a:off x="1301563" y="530914"/>
-            <a:ext cx="4909275" cy="3348227"/>
-            <a:chOff x="1301563" y="530914"/>
-            <a:chExt cx="4909275" cy="3348227"/>
+            <a:off x="2086586" y="996155"/>
+            <a:ext cx="3105062" cy="2752260"/>
+            <a:chOff x="2086586" y="996155"/>
+            <a:chExt cx="3105062" cy="2752260"/>
           </a:xfrm>
         </p:grpSpPr>
         <p:sp>
           <p:nvSpPr>
-            <p:cNvPr id="4" name="角丸四角形 3"/>
+            <p:cNvPr id="44" name="角丸四角形 43"/>
             <p:cNvSpPr/>
             <p:nvPr/>
           </p:nvSpPr>
           <p:spPr>
             <a:xfrm>
-              <a:off x="2718547" y="2737597"/>
-              <a:ext cx="1649506" cy="699247"/>
+              <a:off x="2807224" y="2763747"/>
+              <a:ext cx="1554480" cy="640080"/>
             </a:xfrm>
             <a:prstGeom prst="roundRect">
               <a:avLst/>
             </a:prstGeom>
+            <a:pattFill prst="pct30">
+              <a:fgClr>
+                <a:schemeClr val="bg1">
+                  <a:lumMod val="50000"/>
+                </a:schemeClr>
+              </a:fgClr>
+              <a:bgClr>
+                <a:schemeClr val="bg1"/>
+              </a:bgClr>
+            </a:pattFill>
+            <a:ln>
+              <a:solidFill>
+                <a:schemeClr val="tx1">
+                  <a:lumMod val="65000"/>
+                  <a:lumOff val="35000"/>
+                </a:schemeClr>
+              </a:solidFill>
+            </a:ln>
           </p:spPr>
           <p:style>
             <a:lnRef idx="2">
@@ -4304,18 +4547,255 @@
         </p:sp>
         <p:sp>
           <p:nvSpPr>
-            <p:cNvPr id="5" name="角丸四角形 4"/>
+            <p:cNvPr id="45" name="テキスト ボックス 44"/>
+            <p:cNvSpPr txBox="1"/>
+            <p:nvPr/>
+          </p:nvSpPr>
+          <p:spPr>
+            <a:xfrm>
+              <a:off x="3371852" y="1869656"/>
+              <a:ext cx="890437" cy="276999"/>
+            </a:xfrm>
+            <a:prstGeom prst="rect">
+              <a:avLst/>
+            </a:prstGeom>
+            <a:noFill/>
+          </p:spPr>
+          <p:txBody>
+            <a:bodyPr wrap="none" rtlCol="0">
+              <a:spAutoFit/>
+            </a:bodyPr>
+            <a:lstStyle/>
+            <a:p>
+              <a:r>
+                <a:rPr lang="en-US" sz="1200" dirty="0" smtClean="0">
+                  <a:latin typeface="Times New Roman" panose="02020603050405020304" pitchFamily="18" charset="0"/>
+                  <a:cs typeface="Times New Roman" panose="02020603050405020304" pitchFamily="18" charset="0"/>
+                </a:rPr>
+                <a:t>Toilet bowl</a:t>
+              </a:r>
+              <a:endParaRPr lang="en-US" sz="1200" dirty="0" smtClean="0">
+                <a:latin typeface="Times New Roman" panose="02020603050405020304" pitchFamily="18" charset="0"/>
+                <a:cs typeface="Times New Roman" panose="02020603050405020304" pitchFamily="18" charset="0"/>
+              </a:endParaRPr>
+            </a:p>
+          </p:txBody>
+        </p:sp>
+        <p:cxnSp>
+          <p:nvCxnSpPr>
+            <p:cNvPr id="50" name="直線コネクタ 49"/>
+            <p:cNvCxnSpPr/>
+            <p:nvPr/>
+          </p:nvCxnSpPr>
+          <p:spPr>
+            <a:xfrm>
+              <a:off x="2175309" y="1657176"/>
+              <a:ext cx="2567114" cy="0"/>
+            </a:xfrm>
+            <a:prstGeom prst="line">
+              <a:avLst/>
+            </a:prstGeom>
+            <a:ln>
+              <a:solidFill>
+                <a:schemeClr val="tx1"/>
+              </a:solidFill>
+            </a:ln>
+          </p:spPr>
+          <p:style>
+            <a:lnRef idx="1">
+              <a:schemeClr val="accent1"/>
+            </a:lnRef>
+            <a:fillRef idx="0">
+              <a:schemeClr val="accent1"/>
+            </a:fillRef>
+            <a:effectRef idx="0">
+              <a:schemeClr val="accent1"/>
+            </a:effectRef>
+            <a:fontRef idx="minor">
+              <a:schemeClr val="tx1"/>
+            </a:fontRef>
+          </p:style>
+        </p:cxnSp>
+        <p:sp>
+          <p:nvSpPr>
+            <p:cNvPr id="52" name="テキスト ボックス 51"/>
+            <p:cNvSpPr txBox="1"/>
+            <p:nvPr/>
+          </p:nvSpPr>
+          <p:spPr>
+            <a:xfrm>
+              <a:off x="4699205" y="1447767"/>
+              <a:ext cx="492443" cy="276999"/>
+            </a:xfrm>
+            <a:prstGeom prst="rect">
+              <a:avLst/>
+            </a:prstGeom>
+            <a:noFill/>
+          </p:spPr>
+          <p:txBody>
+            <a:bodyPr wrap="none" rtlCol="0">
+              <a:spAutoFit/>
+            </a:bodyPr>
+            <a:lstStyle/>
+            <a:p>
+              <a:r>
+                <a:rPr lang="en-US" sz="1200" dirty="0" smtClean="0">
+                  <a:latin typeface="Times New Roman" panose="02020603050405020304" pitchFamily="18" charset="0"/>
+                  <a:cs typeface="Times New Roman" panose="02020603050405020304" pitchFamily="18" charset="0"/>
+                </a:rPr>
+                <a:t>10</a:t>
+              </a:r>
+              <a:r>
+                <a:rPr lang="en-US" altLang="ja-JP" sz="1200" dirty="0" smtClean="0">
+                  <a:latin typeface="Times New Roman" panose="02020603050405020304" pitchFamily="18" charset="0"/>
+                  <a:cs typeface="Times New Roman" panose="02020603050405020304" pitchFamily="18" charset="0"/>
+                </a:rPr>
+                <a:t>°</a:t>
+              </a:r>
+              <a:endParaRPr lang="en-US" sz="1200" dirty="0">
+                <a:latin typeface="Times New Roman" panose="02020603050405020304" pitchFamily="18" charset="0"/>
+                <a:cs typeface="Times New Roman" panose="02020603050405020304" pitchFamily="18" charset="0"/>
+              </a:endParaRPr>
+            </a:p>
+          </p:txBody>
+        </p:sp>
+        <p:sp>
+          <p:nvSpPr>
+            <p:cNvPr id="53" name="テキスト ボックス 52"/>
+            <p:cNvSpPr txBox="1"/>
+            <p:nvPr/>
+          </p:nvSpPr>
+          <p:spPr>
+            <a:xfrm>
+              <a:off x="2836460" y="996155"/>
+              <a:ext cx="665567" cy="276999"/>
+            </a:xfrm>
+            <a:prstGeom prst="rect">
+              <a:avLst/>
+            </a:prstGeom>
+            <a:noFill/>
+          </p:spPr>
+          <p:txBody>
+            <a:bodyPr wrap="none" rtlCol="0">
+              <a:spAutoFit/>
+            </a:bodyPr>
+            <a:lstStyle/>
+            <a:p>
+              <a:r>
+                <a:rPr lang="en-US" sz="1200" dirty="0" smtClean="0">
+                  <a:latin typeface="Times New Roman" panose="02020603050405020304" pitchFamily="18" charset="0"/>
+                  <a:cs typeface="Times New Roman" panose="02020603050405020304" pitchFamily="18" charset="0"/>
+                </a:rPr>
+                <a:t>Camera</a:t>
+              </a:r>
+              <a:endParaRPr lang="en-US" dirty="0" smtClean="0">
+                <a:latin typeface="Times New Roman" panose="02020603050405020304" pitchFamily="18" charset="0"/>
+                <a:cs typeface="Times New Roman" panose="02020603050405020304" pitchFamily="18" charset="0"/>
+              </a:endParaRPr>
+            </a:p>
+          </p:txBody>
+        </p:sp>
+        <p:sp>
+          <p:nvSpPr>
+            <p:cNvPr id="54" name="テキスト ボックス 53"/>
+            <p:cNvSpPr txBox="1"/>
+            <p:nvPr/>
+          </p:nvSpPr>
+          <p:spPr>
+            <a:xfrm>
+              <a:off x="4084293" y="3471416"/>
+              <a:ext cx="861133" cy="276999"/>
+            </a:xfrm>
+            <a:prstGeom prst="rect">
+              <a:avLst/>
+            </a:prstGeom>
+            <a:noFill/>
+          </p:spPr>
+          <p:txBody>
+            <a:bodyPr wrap="none" rtlCol="0">
+              <a:spAutoFit/>
+            </a:bodyPr>
+            <a:lstStyle/>
+            <a:p>
+              <a:r>
+                <a:rPr lang="en-US" sz="1200" dirty="0" smtClean="0">
+                  <a:latin typeface="Times New Roman" panose="02020603050405020304" pitchFamily="18" charset="0"/>
+                  <a:cs typeface="Times New Roman" panose="02020603050405020304" pitchFamily="18" charset="0"/>
+                </a:rPr>
+                <a:t>Units[mm]</a:t>
+              </a:r>
+              <a:endParaRPr lang="en-US" dirty="0"/>
+            </a:p>
+          </p:txBody>
+        </p:sp>
+        <p:cxnSp>
+          <p:nvCxnSpPr>
+            <p:cNvPr id="55" name="直線コネクタ 54"/>
+            <p:cNvCxnSpPr/>
+            <p:nvPr/>
+          </p:nvCxnSpPr>
+          <p:spPr>
+            <a:xfrm flipV="1">
+              <a:off x="3371852" y="1666467"/>
+              <a:ext cx="0" cy="1737360"/>
+            </a:xfrm>
+            <a:prstGeom prst="line">
+              <a:avLst/>
+            </a:prstGeom>
+            <a:ln w="12700">
+              <a:solidFill>
+                <a:schemeClr val="tx1"/>
+              </a:solidFill>
+              <a:prstDash val="dash"/>
+            </a:ln>
+          </p:spPr>
+          <p:style>
+            <a:lnRef idx="1">
+              <a:schemeClr val="accent1"/>
+            </a:lnRef>
+            <a:fillRef idx="0">
+              <a:schemeClr val="accent1"/>
+            </a:fillRef>
+            <a:effectRef idx="0">
+              <a:schemeClr val="accent1"/>
+            </a:effectRef>
+            <a:fontRef idx="minor">
+              <a:schemeClr val="tx1"/>
+            </a:fontRef>
+          </p:style>
+        </p:cxnSp>
+        <p:sp>
+          <p:nvSpPr>
+            <p:cNvPr id="56" name="角丸四角形 55"/>
             <p:cNvSpPr/>
             <p:nvPr/>
           </p:nvSpPr>
           <p:spPr>
-            <a:xfrm rot="21024751">
-              <a:off x="2813908" y="1610285"/>
-              <a:ext cx="242047" cy="1165412"/>
+            <a:xfrm rot="15603807">
+              <a:off x="2687166" y="2173701"/>
+              <a:ext cx="983504" cy="219448"/>
             </a:xfrm>
             <a:prstGeom prst="roundRect">
               <a:avLst/>
             </a:prstGeom>
+            <a:pattFill prst="pct30">
+              <a:fgClr>
+                <a:schemeClr val="bg1">
+                  <a:lumMod val="50000"/>
+                </a:schemeClr>
+              </a:fgClr>
+              <a:bgClr>
+                <a:schemeClr val="bg1"/>
+              </a:bgClr>
+            </a:pattFill>
+            <a:ln>
+              <a:solidFill>
+                <a:schemeClr val="tx1">
+                  <a:lumMod val="65000"/>
+                  <a:lumOff val="35000"/>
+                </a:schemeClr>
+              </a:solidFill>
+            </a:ln>
           </p:spPr>
           <p:style>
             <a:lnRef idx="2">
@@ -4342,45 +4822,133 @@
             </a:p>
           </p:txBody>
         </p:sp>
-        <p:sp>
-          <p:nvSpPr>
-            <p:cNvPr id="6" name="テキスト ボックス 5"/>
-            <p:cNvSpPr txBox="1"/>
+        <p:grpSp>
+          <p:nvGrpSpPr>
+            <p:cNvPr id="46" name="グループ化 45"/>
+            <p:cNvGrpSpPr/>
             <p:nvPr/>
-          </p:nvSpPr>
-          <p:spPr>
-            <a:xfrm>
-              <a:off x="2934931" y="3506615"/>
-              <a:ext cx="1208792" cy="369332"/>
+          </p:nvGrpSpPr>
+          <p:grpSpPr>
+            <a:xfrm rot="15739615">
+              <a:off x="3195652" y="1367081"/>
+              <a:ext cx="322730" cy="260350"/>
+              <a:chOff x="6052110" y="2671295"/>
+              <a:chExt cx="322730" cy="260350"/>
             </a:xfrm>
-            <a:prstGeom prst="rect">
-              <a:avLst/>
-            </a:prstGeom>
-            <a:noFill/>
-          </p:spPr>
-          <p:txBody>
-            <a:bodyPr wrap="none" rtlCol="0">
-              <a:spAutoFit/>
-            </a:bodyPr>
-            <a:lstStyle/>
-            <a:p>
-              <a:r>
-                <a:rPr lang="en-US" dirty="0" smtClean="0"/>
-                <a:t>Toilet bowl</a:t>
-              </a:r>
-            </a:p>
-          </p:txBody>
-        </p:sp>
+            <a:pattFill prst="pct70">
+              <a:fgClr>
+                <a:schemeClr val="bg1">
+                  <a:lumMod val="50000"/>
+                </a:schemeClr>
+              </a:fgClr>
+              <a:bgClr>
+                <a:schemeClr val="bg1"/>
+              </a:bgClr>
+            </a:pattFill>
+          </p:grpSpPr>
+          <p:sp>
+            <p:nvSpPr>
+              <p:cNvPr id="47" name="正方形/長方形 46"/>
+              <p:cNvSpPr/>
+              <p:nvPr/>
+            </p:nvSpPr>
+            <p:spPr>
+              <a:xfrm>
+                <a:off x="6114490" y="2712570"/>
+                <a:ext cx="260350" cy="177800"/>
+              </a:xfrm>
+              <a:prstGeom prst="rect">
+                <a:avLst/>
+              </a:prstGeom>
+              <a:grpFill/>
+              <a:ln>
+                <a:solidFill>
+                  <a:schemeClr val="tx1"/>
+                </a:solidFill>
+              </a:ln>
+            </p:spPr>
+            <p:style>
+              <a:lnRef idx="2">
+                <a:schemeClr val="accent1">
+                  <a:shade val="50000"/>
+                </a:schemeClr>
+              </a:lnRef>
+              <a:fillRef idx="1">
+                <a:schemeClr val="accent1"/>
+              </a:fillRef>
+              <a:effectRef idx="0">
+                <a:schemeClr val="accent1"/>
+              </a:effectRef>
+              <a:fontRef idx="minor">
+                <a:schemeClr val="lt1"/>
+              </a:fontRef>
+            </p:style>
+            <p:txBody>
+              <a:bodyPr rtlCol="0" anchor="ctr"/>
+              <a:lstStyle/>
+              <a:p>
+                <a:pPr algn="ctr"/>
+                <a:endParaRPr lang="en-US"/>
+              </a:p>
+            </p:txBody>
+          </p:sp>
+          <p:sp>
+            <p:nvSpPr>
+              <p:cNvPr id="48" name="二等辺三角形 47"/>
+              <p:cNvSpPr/>
+              <p:nvPr/>
+            </p:nvSpPr>
+            <p:spPr>
+              <a:xfrm rot="5400000">
+                <a:off x="5953125" y="2770280"/>
+                <a:ext cx="260350" cy="62380"/>
+              </a:xfrm>
+              <a:prstGeom prst="triangle">
+                <a:avLst/>
+              </a:prstGeom>
+              <a:grpFill/>
+              <a:ln>
+                <a:solidFill>
+                  <a:schemeClr val="tx1"/>
+                </a:solidFill>
+              </a:ln>
+            </p:spPr>
+            <p:style>
+              <a:lnRef idx="2">
+                <a:schemeClr val="accent1">
+                  <a:shade val="50000"/>
+                </a:schemeClr>
+              </a:lnRef>
+              <a:fillRef idx="1">
+                <a:schemeClr val="accent1"/>
+              </a:fillRef>
+              <a:effectRef idx="0">
+                <a:schemeClr val="accent1"/>
+              </a:effectRef>
+              <a:fontRef idx="minor">
+                <a:schemeClr val="lt1"/>
+              </a:fontRef>
+            </p:style>
+            <p:txBody>
+              <a:bodyPr rtlCol="0" anchor="ctr"/>
+              <a:lstStyle/>
+              <a:p>
+                <a:pPr algn="ctr"/>
+                <a:endParaRPr lang="en-US"/>
+              </a:p>
+            </p:txBody>
+          </p:sp>
+        </p:grpSp>
         <p:cxnSp>
           <p:nvCxnSpPr>
-            <p:cNvPr id="10" name="直線コネクタ 9"/>
+            <p:cNvPr id="65" name="直線コネクタ 64"/>
             <p:cNvCxnSpPr/>
             <p:nvPr/>
           </p:nvCxnSpPr>
           <p:spPr>
             <a:xfrm flipV="1">
-              <a:off x="2073088" y="1265767"/>
-              <a:ext cx="0" cy="2171078"/>
+              <a:off x="3370823" y="1479622"/>
+              <a:ext cx="1371600" cy="182880"/>
             </a:xfrm>
             <a:prstGeom prst="line">
               <a:avLst/>
@@ -4406,288 +4974,16 @@
             </a:fontRef>
           </p:style>
         </p:cxnSp>
-        <p:sp>
-          <p:nvSpPr>
-            <p:cNvPr id="12" name="テキスト ボックス 11"/>
-            <p:cNvSpPr txBox="1"/>
-            <p:nvPr/>
-          </p:nvSpPr>
-          <p:spPr>
-            <a:xfrm>
-              <a:off x="1301563" y="2062904"/>
-              <a:ext cx="652743" cy="369332"/>
-            </a:xfrm>
-            <a:prstGeom prst="rect">
-              <a:avLst/>
-            </a:prstGeom>
-            <a:noFill/>
-          </p:spPr>
-          <p:txBody>
-            <a:bodyPr wrap="none" rtlCol="0">
-              <a:spAutoFit/>
-            </a:bodyPr>
-            <a:lstStyle/>
-            <a:p>
-              <a:r>
-                <a:rPr lang="en-US" dirty="0" smtClean="0"/>
-                <a:t>1100</a:t>
-              </a:r>
-              <a:endParaRPr lang="en-US" dirty="0"/>
-            </a:p>
-          </p:txBody>
-        </p:sp>
-        <p:sp>
-          <p:nvSpPr>
-            <p:cNvPr id="13" name="テキスト ボックス 12"/>
-            <p:cNvSpPr txBox="1"/>
-            <p:nvPr/>
-          </p:nvSpPr>
-          <p:spPr>
-            <a:xfrm>
-              <a:off x="2551185" y="530914"/>
-              <a:ext cx="904478" cy="369332"/>
-            </a:xfrm>
-            <a:prstGeom prst="rect">
-              <a:avLst/>
-            </a:prstGeom>
-            <a:noFill/>
-          </p:spPr>
-          <p:txBody>
-            <a:bodyPr wrap="none" rtlCol="0">
-              <a:spAutoFit/>
-            </a:bodyPr>
-            <a:lstStyle/>
-            <a:p>
-              <a:r>
-                <a:rPr lang="en-US" dirty="0" smtClean="0"/>
-                <a:t>Camera</a:t>
-              </a:r>
-            </a:p>
-          </p:txBody>
-        </p:sp>
-        <p:sp>
-          <p:nvSpPr>
-            <p:cNvPr id="14" name="テキスト ボックス 13"/>
-            <p:cNvSpPr txBox="1"/>
-            <p:nvPr/>
-          </p:nvSpPr>
-          <p:spPr>
-            <a:xfrm>
-              <a:off x="5027501" y="3509809"/>
-              <a:ext cx="1183337" cy="369332"/>
-            </a:xfrm>
-            <a:prstGeom prst="rect">
-              <a:avLst/>
-            </a:prstGeom>
-            <a:noFill/>
-          </p:spPr>
-          <p:txBody>
-            <a:bodyPr wrap="none" rtlCol="0">
-              <a:spAutoFit/>
-            </a:bodyPr>
-            <a:lstStyle/>
-            <a:p>
-              <a:r>
-                <a:rPr lang="en-US" dirty="0" smtClean="0"/>
-                <a:t>Units[mm]</a:t>
-              </a:r>
-              <a:endParaRPr lang="en-US" dirty="0"/>
-            </a:p>
-          </p:txBody>
-        </p:sp>
         <p:cxnSp>
           <p:nvCxnSpPr>
-            <p:cNvPr id="18" name="直線コネクタ 17"/>
+            <p:cNvPr id="74" name="直線コネクタ 73"/>
             <p:cNvCxnSpPr/>
             <p:nvPr/>
           </p:nvCxnSpPr>
           <p:spPr>
             <a:xfrm>
-              <a:off x="3145219" y="1265767"/>
-              <a:ext cx="0" cy="1470850"/>
-            </a:xfrm>
-            <a:prstGeom prst="line">
-              <a:avLst/>
-            </a:prstGeom>
-            <a:ln>
-              <a:solidFill>
-                <a:schemeClr val="bg1">
-                  <a:lumMod val="50000"/>
-                </a:schemeClr>
-              </a:solidFill>
-              <a:prstDash val="dash"/>
-            </a:ln>
-          </p:spPr>
-          <p:style>
-            <a:lnRef idx="1">
-              <a:schemeClr val="accent1"/>
-            </a:lnRef>
-            <a:fillRef idx="0">
-              <a:schemeClr val="accent1"/>
-            </a:fillRef>
-            <a:effectRef idx="0">
-              <a:schemeClr val="accent1"/>
-            </a:effectRef>
-            <a:fontRef idx="minor">
-              <a:schemeClr val="tx1"/>
-            </a:fontRef>
-          </p:style>
-        </p:cxnSp>
-        <p:grpSp>
-          <p:nvGrpSpPr>
-            <p:cNvPr id="25" name="グループ化 24"/>
-            <p:cNvGrpSpPr/>
-            <p:nvPr/>
-          </p:nvGrpSpPr>
-          <p:grpSpPr>
-            <a:xfrm rot="21009347">
-              <a:off x="2971742" y="835428"/>
-              <a:ext cx="1483784" cy="330461"/>
-              <a:chOff x="1943042" y="936765"/>
-              <a:chExt cx="1483784" cy="330461"/>
-            </a:xfrm>
-          </p:grpSpPr>
-          <p:grpSp>
-            <p:nvGrpSpPr>
-              <p:cNvPr id="8" name="グループ化 7"/>
-              <p:cNvGrpSpPr/>
-              <p:nvPr/>
-            </p:nvGrpSpPr>
-            <p:grpSpPr>
-              <a:xfrm rot="16200000">
-                <a:off x="1920319" y="967955"/>
-                <a:ext cx="322730" cy="260350"/>
-                <a:chOff x="6052110" y="2671295"/>
-                <a:chExt cx="322730" cy="260350"/>
-              </a:xfrm>
-            </p:grpSpPr>
-            <p:sp>
-              <p:nvSpPr>
-                <p:cNvPr id="15" name="正方形/長方形 14"/>
-                <p:cNvSpPr/>
-                <p:nvPr/>
-              </p:nvSpPr>
-              <p:spPr>
-                <a:xfrm>
-                  <a:off x="6114490" y="2712570"/>
-                  <a:ext cx="260350" cy="177800"/>
-                </a:xfrm>
-                <a:prstGeom prst="rect">
-                  <a:avLst/>
-                </a:prstGeom>
-              </p:spPr>
-              <p:style>
-                <a:lnRef idx="2">
-                  <a:schemeClr val="accent1">
-                    <a:shade val="50000"/>
-                  </a:schemeClr>
-                </a:lnRef>
-                <a:fillRef idx="1">
-                  <a:schemeClr val="accent1"/>
-                </a:fillRef>
-                <a:effectRef idx="0">
-                  <a:schemeClr val="accent1"/>
-                </a:effectRef>
-                <a:fontRef idx="minor">
-                  <a:schemeClr val="lt1"/>
-                </a:fontRef>
-              </p:style>
-              <p:txBody>
-                <a:bodyPr rtlCol="0" anchor="ctr"/>
-                <a:lstStyle/>
-                <a:p>
-                  <a:pPr algn="ctr"/>
-                  <a:endParaRPr lang="en-US"/>
-                </a:p>
-              </p:txBody>
-            </p:sp>
-            <p:sp>
-              <p:nvSpPr>
-                <p:cNvPr id="16" name="二等辺三角形 15"/>
-                <p:cNvSpPr/>
-                <p:nvPr/>
-              </p:nvSpPr>
-              <p:spPr>
-                <a:xfrm rot="5400000">
-                  <a:off x="5953125" y="2770280"/>
-                  <a:ext cx="260350" cy="62380"/>
-                </a:xfrm>
-                <a:prstGeom prst="triangle">
-                  <a:avLst/>
-                </a:prstGeom>
-              </p:spPr>
-              <p:style>
-                <a:lnRef idx="2">
-                  <a:schemeClr val="accent1">
-                    <a:shade val="50000"/>
-                  </a:schemeClr>
-                </a:lnRef>
-                <a:fillRef idx="1">
-                  <a:schemeClr val="accent1"/>
-                </a:fillRef>
-                <a:effectRef idx="0">
-                  <a:schemeClr val="accent1"/>
-                </a:effectRef>
-                <a:fontRef idx="minor">
-                  <a:schemeClr val="lt1"/>
-                </a:fontRef>
-              </p:style>
-              <p:txBody>
-                <a:bodyPr rtlCol="0" anchor="ctr"/>
-                <a:lstStyle/>
-                <a:p>
-                  <a:pPr algn="ctr"/>
-                  <a:endParaRPr lang="en-US"/>
-                </a:p>
-              </p:txBody>
-            </p:sp>
-          </p:grpSp>
-          <p:cxnSp>
-            <p:nvCxnSpPr>
-              <p:cNvPr id="22" name="直線コネクタ 21"/>
-              <p:cNvCxnSpPr/>
-              <p:nvPr/>
-            </p:nvCxnSpPr>
-            <p:spPr>
-              <a:xfrm flipV="1">
-                <a:off x="1943042" y="1267226"/>
-                <a:ext cx="1483784" cy="0"/>
-              </a:xfrm>
-              <a:prstGeom prst="line">
-                <a:avLst/>
-              </a:prstGeom>
-              <a:ln>
-                <a:solidFill>
-                  <a:schemeClr val="tx1"/>
-                </a:solidFill>
-              </a:ln>
-            </p:spPr>
-            <p:style>
-              <a:lnRef idx="1">
-                <a:schemeClr val="accent1"/>
-              </a:lnRef>
-              <a:fillRef idx="0">
-                <a:schemeClr val="accent1"/>
-              </a:fillRef>
-              <a:effectRef idx="0">
-                <a:schemeClr val="accent1"/>
-              </a:effectRef>
-              <a:fontRef idx="minor">
-                <a:schemeClr val="tx1"/>
-              </a:fontRef>
-            </p:style>
-          </p:cxnSp>
-        </p:grpSp>
-        <p:cxnSp>
-          <p:nvCxnSpPr>
-            <p:cNvPr id="30" name="直線コネクタ 29"/>
-            <p:cNvCxnSpPr/>
-            <p:nvPr/>
-          </p:nvCxnSpPr>
-          <p:spPr>
-            <a:xfrm>
-              <a:off x="3017935" y="1287508"/>
-              <a:ext cx="1494798" cy="0"/>
+              <a:off x="2167144" y="3403827"/>
+              <a:ext cx="2194560" cy="0"/>
             </a:xfrm>
             <a:prstGeom prst="line">
               <a:avLst/>
@@ -4713,19 +5009,60 @@
             </a:fontRef>
           </p:style>
         </p:cxnSp>
+        <p:cxnSp>
+          <p:nvCxnSpPr>
+            <p:cNvPr id="81" name="直線コネクタ 80"/>
+            <p:cNvCxnSpPr/>
+            <p:nvPr/>
+          </p:nvCxnSpPr>
+          <p:spPr>
+            <a:xfrm flipV="1">
+              <a:off x="2341949" y="1666467"/>
+              <a:ext cx="0" cy="1737360"/>
+            </a:xfrm>
+            <a:prstGeom prst="line">
+              <a:avLst/>
+            </a:prstGeom>
+            <a:ln w="6350">
+              <a:solidFill>
+                <a:schemeClr val="tx1"/>
+              </a:solidFill>
+              <a:prstDash val="solid"/>
+              <a:headEnd type="arrow" w="med" len="med"/>
+              <a:tailEnd type="arrow" w="med" len="med"/>
+            </a:ln>
+          </p:spPr>
+          <p:style>
+            <a:lnRef idx="1">
+              <a:schemeClr val="accent1"/>
+            </a:lnRef>
+            <a:fillRef idx="0">
+              <a:schemeClr val="accent1"/>
+            </a:fillRef>
+            <a:effectRef idx="0">
+              <a:schemeClr val="accent1"/>
+            </a:effectRef>
+            <a:fontRef idx="minor">
+              <a:schemeClr val="tx1"/>
+            </a:fontRef>
+          </p:style>
+        </p:cxnSp>
         <p:sp>
           <p:nvSpPr>
-            <p:cNvPr id="34" name="円弧 33"/>
+            <p:cNvPr id="82" name="円弧 81"/>
             <p:cNvSpPr/>
             <p:nvPr/>
           </p:nvSpPr>
           <p:spPr>
-            <a:xfrm rot="2725808">
-              <a:off x="4120219" y="993659"/>
-              <a:ext cx="338720" cy="354037"/>
+            <a:xfrm rot="21190911">
+              <a:off x="4153029" y="1466817"/>
+              <a:ext cx="279132" cy="279132"/>
             </a:xfrm>
             <a:prstGeom prst="arc">
-              <a:avLst/>
+              <a:avLst>
+                <a:gd name="adj1" fmla="val 19940876"/>
+                <a:gd name="adj2" fmla="val 1730181"/>
+              </a:avLst>
             </a:prstGeom>
             <a:ln>
               <a:solidFill>
@@ -4758,14 +5095,14 @@
         </p:sp>
         <p:sp>
           <p:nvSpPr>
-            <p:cNvPr id="35" name="テキスト ボックス 34"/>
+            <p:cNvPr id="83" name="テキスト ボックス 82"/>
             <p:cNvSpPr txBox="1"/>
             <p:nvPr/>
           </p:nvSpPr>
           <p:spPr>
-            <a:xfrm>
-              <a:off x="4479873" y="978790"/>
-              <a:ext cx="649537" cy="369332"/>
+            <a:xfrm rot="16200000">
+              <a:off x="1981718" y="2337490"/>
+              <a:ext cx="486736" cy="276999"/>
             </a:xfrm>
             <a:prstGeom prst="rect">
               <a:avLst/>
@@ -4779,87 +5116,19 @@
             <a:lstStyle/>
             <a:p>
               <a:r>
-                <a:rPr lang="en-US" dirty="0" smtClean="0"/>
-                <a:t>10</a:t>
+                <a:rPr lang="en-US" sz="1200" dirty="0" smtClean="0">
+                  <a:latin typeface="Times New Roman" panose="02020603050405020304" pitchFamily="18" charset="0"/>
+                  <a:cs typeface="Times New Roman" panose="02020603050405020304" pitchFamily="18" charset="0"/>
+                </a:rPr>
+                <a:t>1100</a:t>
               </a:r>
-              <a:r>
-                <a:rPr lang="en-US" altLang="ja-JP" dirty="0" smtClean="0"/>
-                <a:t>°</a:t>
-              </a:r>
-              <a:endParaRPr lang="en-US" dirty="0"/>
+              <a:endParaRPr lang="en-US" sz="1200" dirty="0">
+                <a:latin typeface="Times New Roman" panose="02020603050405020304" pitchFamily="18" charset="0"/>
+                <a:cs typeface="Times New Roman" panose="02020603050405020304" pitchFamily="18" charset="0"/>
+              </a:endParaRPr>
             </a:p>
           </p:txBody>
         </p:sp>
-        <p:cxnSp>
-          <p:nvCxnSpPr>
-            <p:cNvPr id="36" name="直線コネクタ 35"/>
-            <p:cNvCxnSpPr/>
-            <p:nvPr/>
-          </p:nvCxnSpPr>
-          <p:spPr>
-            <a:xfrm>
-              <a:off x="1954306" y="1274808"/>
-              <a:ext cx="1197011" cy="0"/>
-            </a:xfrm>
-            <a:prstGeom prst="line">
-              <a:avLst/>
-            </a:prstGeom>
-            <a:ln>
-              <a:solidFill>
-                <a:schemeClr val="tx1"/>
-              </a:solidFill>
-            </a:ln>
-          </p:spPr>
-          <p:style>
-            <a:lnRef idx="1">
-              <a:schemeClr val="accent1"/>
-            </a:lnRef>
-            <a:fillRef idx="0">
-              <a:schemeClr val="accent1"/>
-            </a:fillRef>
-            <a:effectRef idx="0">
-              <a:schemeClr val="accent1"/>
-            </a:effectRef>
-            <a:fontRef idx="minor">
-              <a:schemeClr val="tx1"/>
-            </a:fontRef>
-          </p:style>
-        </p:cxnSp>
-        <p:cxnSp>
-          <p:nvCxnSpPr>
-            <p:cNvPr id="37" name="直線コネクタ 36"/>
-            <p:cNvCxnSpPr/>
-            <p:nvPr/>
-          </p:nvCxnSpPr>
-          <p:spPr>
-            <a:xfrm>
-              <a:off x="1954306" y="3436844"/>
-              <a:ext cx="1197011" cy="0"/>
-            </a:xfrm>
-            <a:prstGeom prst="line">
-              <a:avLst/>
-            </a:prstGeom>
-            <a:ln>
-              <a:solidFill>
-                <a:schemeClr val="tx1"/>
-              </a:solidFill>
-            </a:ln>
-          </p:spPr>
-          <p:style>
-            <a:lnRef idx="1">
-              <a:schemeClr val="accent1"/>
-            </a:lnRef>
-            <a:fillRef idx="0">
-              <a:schemeClr val="accent1"/>
-            </a:fillRef>
-            <a:effectRef idx="0">
-              <a:schemeClr val="accent1"/>
-            </a:effectRef>
-            <a:fontRef idx="minor">
-              <a:schemeClr val="tx1"/>
-            </a:fontRef>
-          </p:style>
-        </p:cxnSp>
       </p:grpSp>
     </p:spTree>
     <p:extLst>
@@ -4871,6 +5140,13 @@
   <p:clrMapOvr>
     <a:masterClrMapping/>
   </p:clrMapOvr>
+  <p:timing>
+    <p:tnLst>
+      <p:par>
+        <p:cTn id="1" dur="indefinite" restart="never" nodeType="tmRoot"/>
+      </p:par>
+    </p:tnLst>
+  </p:timing>
 </p:sld>
 </file>
 

</xml_diff>